<commit_message>
"correction et ajouts images"
</commit_message>
<xml_diff>
--- a/misc/ressource_schema.pptx
+++ b/misc/ressource_schema.pptx
@@ -8,6 +8,7 @@
     <p:sldId id="256" r:id="rId2"/>
     <p:sldId id="257" r:id="rId3"/>
     <p:sldId id="258" r:id="rId4"/>
+    <p:sldId id="259" r:id="rId5"/>
   </p:sldIdLst>
   <p:sldSz cx="12192000" cy="6858000"/>
   <p:notesSz cx="6858000" cy="9144000"/>
@@ -1301,21 +1302,21 @@
     </dgm:pt>
   </dgm:ptLst>
   <dgm:cxnLst>
+    <dgm:cxn modelId="{F1DDAE29-52EA-6944-99FD-646096D25033}" srcId="{77D09C5B-F056-154A-BF12-F6FF90D491EA}" destId="{4E3D726E-9F5F-2A4B-B132-FA30CC98ECAA}" srcOrd="2" destOrd="0" parTransId="{7F52158F-AF4E-2D42-97C8-5AA4C15DE06A}" sibTransId="{AEFDE357-9BC7-8046-83DE-196CE1629270}"/>
+    <dgm:cxn modelId="{D70A3BAA-D844-7146-AB03-598EDBFFAF4B}" type="presOf" srcId="{7A6F3F50-BAC5-E042-B802-790656CA163D}" destId="{DED4779D-D920-2442-BA0B-B557385B3495}" srcOrd="0" destOrd="0" presId="urn:microsoft.com/office/officeart/2005/8/layout/chevron1"/>
+    <dgm:cxn modelId="{5F3BBB25-A0C6-D041-81F8-AD6CFCC67E00}" type="presOf" srcId="{89517B2B-7918-9041-90B4-B77982902102}" destId="{E72CD990-91F1-1146-A154-8205C21E2987}" srcOrd="0" destOrd="0" presId="urn:microsoft.com/office/officeart/2005/8/layout/chevron1"/>
+    <dgm:cxn modelId="{DA4FA78B-9961-9E49-AFCD-49683ECC8ABA}" srcId="{77D09C5B-F056-154A-BF12-F6FF90D491EA}" destId="{F06FC740-6C21-FA45-84D0-8DE4F7C865EE}" srcOrd="0" destOrd="0" parTransId="{9A1E6A6D-0D1E-BE4F-B8E0-09C4CE65560F}" sibTransId="{CFAB3EBE-24F7-2F45-BB11-14B81417E63A}"/>
+    <dgm:cxn modelId="{389CD86A-907C-F647-B47C-DDA373C83CB6}" type="presOf" srcId="{32041A60-7981-4045-A617-825177F8CEA0}" destId="{0720FE6F-A77F-AE4F-9F9D-105CE0C4C7C4}" srcOrd="0" destOrd="0" presId="urn:microsoft.com/office/officeart/2005/8/layout/chevron1"/>
+    <dgm:cxn modelId="{A5E51F4E-E0A7-C846-B5DE-82599706B1D6}" type="presOf" srcId="{2D042262-515C-AD4E-9D45-EA77036637A2}" destId="{325E9C80-39E8-9D45-A289-9A2239D076F9}" srcOrd="0" destOrd="0" presId="urn:microsoft.com/office/officeart/2005/8/layout/chevron1"/>
+    <dgm:cxn modelId="{7F74DD29-204F-7E47-89D7-E27771CBF6C3}" type="presOf" srcId="{77D09C5B-F056-154A-BF12-F6FF90D491EA}" destId="{7F164661-8799-3D42-BA41-8F3FBB4B018E}" srcOrd="0" destOrd="0" presId="urn:microsoft.com/office/officeart/2005/8/layout/chevron1"/>
+    <dgm:cxn modelId="{D6EA99F2-6F92-AA4C-9943-4EF6EFF5FE6B}" srcId="{77D09C5B-F056-154A-BF12-F6FF90D491EA}" destId="{9F1B1D84-DD95-5044-9C09-62432F13D65B}" srcOrd="1" destOrd="0" parTransId="{DE8E53BC-4532-CC47-AC97-85538C77DE08}" sibTransId="{26AD4A61-67A4-A34B-8BE3-47E70FC6FE17}"/>
+    <dgm:cxn modelId="{29956288-24C2-814E-BBBB-A70830CCB1E0}" type="presOf" srcId="{9F1B1D84-DD95-5044-9C09-62432F13D65B}" destId="{9940304B-C316-5943-A982-C36749F3E1A0}" srcOrd="0" destOrd="0" presId="urn:microsoft.com/office/officeart/2005/8/layout/chevron1"/>
+    <dgm:cxn modelId="{EDCF173E-1D65-CD4D-B777-371B1032071D}" srcId="{77D09C5B-F056-154A-BF12-F6FF90D491EA}" destId="{2D042262-515C-AD4E-9D45-EA77036637A2}" srcOrd="4" destOrd="0" parTransId="{9B563A3C-3F6F-E44F-A3AF-E635B3A92ACD}" sibTransId="{AEDEAF27-6115-8B42-9AF0-70F00F3691C8}"/>
+    <dgm:cxn modelId="{49BA1D50-FD52-DE47-BEA8-6F8CE778CAB2}" type="presOf" srcId="{F06FC740-6C21-FA45-84D0-8DE4F7C865EE}" destId="{7717E237-248E-0A4B-B0BC-34E2F769F106}" srcOrd="0" destOrd="0" presId="urn:microsoft.com/office/officeart/2005/8/layout/chevron1"/>
     <dgm:cxn modelId="{71F7C35F-1675-A54F-9B5D-16DFD3CD103F}" srcId="{77D09C5B-F056-154A-BF12-F6FF90D491EA}" destId="{7A6F3F50-BAC5-E042-B802-790656CA163D}" srcOrd="6" destOrd="0" parTransId="{DB5BFF5A-70F7-2D43-ACFA-3BDBD0264AE1}" sibTransId="{21197E63-2C8B-704A-83C8-FCE9A654AEE9}"/>
-    <dgm:cxn modelId="{D70A3BAA-D844-7146-AB03-598EDBFFAF4B}" type="presOf" srcId="{7A6F3F50-BAC5-E042-B802-790656CA163D}" destId="{DED4779D-D920-2442-BA0B-B557385B3495}" srcOrd="0" destOrd="0" presId="urn:microsoft.com/office/officeart/2005/8/layout/chevron1"/>
-    <dgm:cxn modelId="{49BA1D50-FD52-DE47-BEA8-6F8CE778CAB2}" type="presOf" srcId="{F06FC740-6C21-FA45-84D0-8DE4F7C865EE}" destId="{7717E237-248E-0A4B-B0BC-34E2F769F106}" srcOrd="0" destOrd="0" presId="urn:microsoft.com/office/officeart/2005/8/layout/chevron1"/>
-    <dgm:cxn modelId="{DA4FA78B-9961-9E49-AFCD-49683ECC8ABA}" srcId="{77D09C5B-F056-154A-BF12-F6FF90D491EA}" destId="{F06FC740-6C21-FA45-84D0-8DE4F7C865EE}" srcOrd="0" destOrd="0" parTransId="{9A1E6A6D-0D1E-BE4F-B8E0-09C4CE65560F}" sibTransId="{CFAB3EBE-24F7-2F45-BB11-14B81417E63A}"/>
-    <dgm:cxn modelId="{D6EA99F2-6F92-AA4C-9943-4EF6EFF5FE6B}" srcId="{77D09C5B-F056-154A-BF12-F6FF90D491EA}" destId="{9F1B1D84-DD95-5044-9C09-62432F13D65B}" srcOrd="1" destOrd="0" parTransId="{DE8E53BC-4532-CC47-AC97-85538C77DE08}" sibTransId="{26AD4A61-67A4-A34B-8BE3-47E70FC6FE17}"/>
     <dgm:cxn modelId="{14F1B3DC-11CE-DA48-AC21-ABB1EF1C6DCC}" type="presOf" srcId="{4E3D726E-9F5F-2A4B-B132-FA30CC98ECAA}" destId="{D379D95D-C299-2742-92DF-26727F8F49F1}" srcOrd="0" destOrd="0" presId="urn:microsoft.com/office/officeart/2005/8/layout/chevron1"/>
-    <dgm:cxn modelId="{389CD86A-907C-F647-B47C-DDA373C83CB6}" type="presOf" srcId="{32041A60-7981-4045-A617-825177F8CEA0}" destId="{0720FE6F-A77F-AE4F-9F9D-105CE0C4C7C4}" srcOrd="0" destOrd="0" presId="urn:microsoft.com/office/officeart/2005/8/layout/chevron1"/>
-    <dgm:cxn modelId="{EDCF173E-1D65-CD4D-B777-371B1032071D}" srcId="{77D09C5B-F056-154A-BF12-F6FF90D491EA}" destId="{2D042262-515C-AD4E-9D45-EA77036637A2}" srcOrd="4" destOrd="0" parTransId="{9B563A3C-3F6F-E44F-A3AF-E635B3A92ACD}" sibTransId="{AEDEAF27-6115-8B42-9AF0-70F00F3691C8}"/>
-    <dgm:cxn modelId="{F1DDAE29-52EA-6944-99FD-646096D25033}" srcId="{77D09C5B-F056-154A-BF12-F6FF90D491EA}" destId="{4E3D726E-9F5F-2A4B-B132-FA30CC98ECAA}" srcOrd="2" destOrd="0" parTransId="{7F52158F-AF4E-2D42-97C8-5AA4C15DE06A}" sibTransId="{AEFDE357-9BC7-8046-83DE-196CE1629270}"/>
-    <dgm:cxn modelId="{29956288-24C2-814E-BBBB-A70830CCB1E0}" type="presOf" srcId="{9F1B1D84-DD95-5044-9C09-62432F13D65B}" destId="{9940304B-C316-5943-A982-C36749F3E1A0}" srcOrd="0" destOrd="0" presId="urn:microsoft.com/office/officeart/2005/8/layout/chevron1"/>
-    <dgm:cxn modelId="{7F74DD29-204F-7E47-89D7-E27771CBF6C3}" type="presOf" srcId="{77D09C5B-F056-154A-BF12-F6FF90D491EA}" destId="{7F164661-8799-3D42-BA41-8F3FBB4B018E}" srcOrd="0" destOrd="0" presId="urn:microsoft.com/office/officeart/2005/8/layout/chevron1"/>
     <dgm:cxn modelId="{BC776C7C-2A69-6A4D-96AA-367F377B4C5D}" srcId="{77D09C5B-F056-154A-BF12-F6FF90D491EA}" destId="{89517B2B-7918-9041-90B4-B77982902102}" srcOrd="3" destOrd="0" parTransId="{2682AE13-C185-814F-897D-195849FC1160}" sibTransId="{15DE8855-80B4-6E43-9996-6519C80F6DE9}"/>
-    <dgm:cxn modelId="{5F3BBB25-A0C6-D041-81F8-AD6CFCC67E00}" type="presOf" srcId="{89517B2B-7918-9041-90B4-B77982902102}" destId="{E72CD990-91F1-1146-A154-8205C21E2987}" srcOrd="0" destOrd="0" presId="urn:microsoft.com/office/officeart/2005/8/layout/chevron1"/>
     <dgm:cxn modelId="{D8457BEB-685F-D64F-B43F-A74C75CB7EE4}" srcId="{77D09C5B-F056-154A-BF12-F6FF90D491EA}" destId="{32041A60-7981-4045-A617-825177F8CEA0}" srcOrd="5" destOrd="0" parTransId="{02531699-8345-FA44-9700-8601E1089E18}" sibTransId="{8DEBBB1B-BD9A-A142-BA7D-B5BED39496E7}"/>
-    <dgm:cxn modelId="{A5E51F4E-E0A7-C846-B5DE-82599706B1D6}" type="presOf" srcId="{2D042262-515C-AD4E-9D45-EA77036637A2}" destId="{325E9C80-39E8-9D45-A289-9A2239D076F9}" srcOrd="0" destOrd="0" presId="urn:microsoft.com/office/officeart/2005/8/layout/chevron1"/>
     <dgm:cxn modelId="{51D16482-83E0-AF44-A082-88F1ADFFB08D}" type="presParOf" srcId="{7F164661-8799-3D42-BA41-8F3FBB4B018E}" destId="{7717E237-248E-0A4B-B0BC-34E2F769F106}" srcOrd="0" destOrd="0" presId="urn:microsoft.com/office/officeart/2005/8/layout/chevron1"/>
     <dgm:cxn modelId="{82358808-50E7-9D4A-A9D8-5799EA3BF642}" type="presParOf" srcId="{7F164661-8799-3D42-BA41-8F3FBB4B018E}" destId="{DB2A8BF8-9EDF-C247-BB3F-6986A2A841F9}" srcOrd="1" destOrd="0" presId="urn:microsoft.com/office/officeart/2005/8/layout/chevron1"/>
     <dgm:cxn modelId="{50B7CDF2-1399-EE41-BA44-722B8992CE52}" type="presParOf" srcId="{7F164661-8799-3D42-BA41-8F3FBB4B018E}" destId="{9940304B-C316-5943-A982-C36749F3E1A0}" srcOrd="2" destOrd="0" presId="urn:microsoft.com/office/officeart/2005/8/layout/chevron1"/>
@@ -3512,7 +3513,7 @@
           <a:p>
             <a:fld id="{3D2A391D-1BD2-794E-8CCC-A63A886ABC5F}" type="datetimeFigureOut">
               <a:rPr kumimoji="1" lang="zh-CN" altLang="en-US" smtClean="0"/>
-              <a:t>15/12/9</a:t>
+              <a:t>2015/12/10</a:t>
             </a:fld>
             <a:endParaRPr kumimoji="1" lang="zh-CN" altLang="en-US"/>
           </a:p>
@@ -3554,7 +3555,7 @@
           <a:p>
             <a:fld id="{A8E43526-6589-1747-96E9-74479CC7908E}" type="slidenum">
               <a:rPr kumimoji="1" lang="zh-CN" altLang="en-US" smtClean="0"/>
-              <a:t>‹#›</a:t>
+              <a:t>‹N°›</a:t>
             </a:fld>
             <a:endParaRPr kumimoji="1" lang="zh-CN" altLang="en-US"/>
           </a:p>
@@ -3682,7 +3683,7 @@
           <a:p>
             <a:fld id="{3D2A391D-1BD2-794E-8CCC-A63A886ABC5F}" type="datetimeFigureOut">
               <a:rPr kumimoji="1" lang="zh-CN" altLang="en-US" smtClean="0"/>
-              <a:t>15/12/9</a:t>
+              <a:t>2015/12/10</a:t>
             </a:fld>
             <a:endParaRPr kumimoji="1" lang="zh-CN" altLang="en-US"/>
           </a:p>
@@ -3724,7 +3725,7 @@
           <a:p>
             <a:fld id="{A8E43526-6589-1747-96E9-74479CC7908E}" type="slidenum">
               <a:rPr kumimoji="1" lang="zh-CN" altLang="en-US" smtClean="0"/>
-              <a:t>‹#›</a:t>
+              <a:t>‹N°›</a:t>
             </a:fld>
             <a:endParaRPr kumimoji="1" lang="zh-CN" altLang="en-US"/>
           </a:p>
@@ -3862,7 +3863,7 @@
           <a:p>
             <a:fld id="{3D2A391D-1BD2-794E-8CCC-A63A886ABC5F}" type="datetimeFigureOut">
               <a:rPr kumimoji="1" lang="zh-CN" altLang="en-US" smtClean="0"/>
-              <a:t>15/12/9</a:t>
+              <a:t>2015/12/10</a:t>
             </a:fld>
             <a:endParaRPr kumimoji="1" lang="zh-CN" altLang="en-US"/>
           </a:p>
@@ -3904,7 +3905,7 @@
           <a:p>
             <a:fld id="{A8E43526-6589-1747-96E9-74479CC7908E}" type="slidenum">
               <a:rPr kumimoji="1" lang="zh-CN" altLang="en-US" smtClean="0"/>
-              <a:t>‹#›</a:t>
+              <a:t>‹N°›</a:t>
             </a:fld>
             <a:endParaRPr kumimoji="1" lang="zh-CN" altLang="en-US"/>
           </a:p>
@@ -4032,7 +4033,7 @@
           <a:p>
             <a:fld id="{3D2A391D-1BD2-794E-8CCC-A63A886ABC5F}" type="datetimeFigureOut">
               <a:rPr kumimoji="1" lang="zh-CN" altLang="en-US" smtClean="0"/>
-              <a:t>15/12/9</a:t>
+              <a:t>2015/12/10</a:t>
             </a:fld>
             <a:endParaRPr kumimoji="1" lang="zh-CN" altLang="en-US"/>
           </a:p>
@@ -4074,7 +4075,7 @@
           <a:p>
             <a:fld id="{A8E43526-6589-1747-96E9-74479CC7908E}" type="slidenum">
               <a:rPr kumimoji="1" lang="zh-CN" altLang="en-US" smtClean="0"/>
-              <a:t>‹#›</a:t>
+              <a:t>‹N°›</a:t>
             </a:fld>
             <a:endParaRPr kumimoji="1" lang="zh-CN" altLang="en-US"/>
           </a:p>
@@ -4278,7 +4279,7 @@
           <a:p>
             <a:fld id="{3D2A391D-1BD2-794E-8CCC-A63A886ABC5F}" type="datetimeFigureOut">
               <a:rPr kumimoji="1" lang="zh-CN" altLang="en-US" smtClean="0"/>
-              <a:t>15/12/9</a:t>
+              <a:t>2015/12/10</a:t>
             </a:fld>
             <a:endParaRPr kumimoji="1" lang="zh-CN" altLang="en-US"/>
           </a:p>
@@ -4320,7 +4321,7 @@
           <a:p>
             <a:fld id="{A8E43526-6589-1747-96E9-74479CC7908E}" type="slidenum">
               <a:rPr kumimoji="1" lang="zh-CN" altLang="en-US" smtClean="0"/>
-              <a:t>‹#›</a:t>
+              <a:t>‹N°›</a:t>
             </a:fld>
             <a:endParaRPr kumimoji="1" lang="zh-CN" altLang="en-US"/>
           </a:p>
@@ -4510,7 +4511,7 @@
           <a:p>
             <a:fld id="{3D2A391D-1BD2-794E-8CCC-A63A886ABC5F}" type="datetimeFigureOut">
               <a:rPr kumimoji="1" lang="zh-CN" altLang="en-US" smtClean="0"/>
-              <a:t>15/12/9</a:t>
+              <a:t>2015/12/10</a:t>
             </a:fld>
             <a:endParaRPr kumimoji="1" lang="zh-CN" altLang="en-US"/>
           </a:p>
@@ -4552,7 +4553,7 @@
           <a:p>
             <a:fld id="{A8E43526-6589-1747-96E9-74479CC7908E}" type="slidenum">
               <a:rPr kumimoji="1" lang="zh-CN" altLang="en-US" smtClean="0"/>
-              <a:t>‹#›</a:t>
+              <a:t>‹N°›</a:t>
             </a:fld>
             <a:endParaRPr kumimoji="1" lang="zh-CN" altLang="en-US"/>
           </a:p>
@@ -4877,7 +4878,7 @@
           <a:p>
             <a:fld id="{3D2A391D-1BD2-794E-8CCC-A63A886ABC5F}" type="datetimeFigureOut">
               <a:rPr kumimoji="1" lang="zh-CN" altLang="en-US" smtClean="0"/>
-              <a:t>15/12/9</a:t>
+              <a:t>2015/12/10</a:t>
             </a:fld>
             <a:endParaRPr kumimoji="1" lang="zh-CN" altLang="en-US"/>
           </a:p>
@@ -4919,7 +4920,7 @@
           <a:p>
             <a:fld id="{A8E43526-6589-1747-96E9-74479CC7908E}" type="slidenum">
               <a:rPr kumimoji="1" lang="zh-CN" altLang="en-US" smtClean="0"/>
-              <a:t>‹#›</a:t>
+              <a:t>‹N°›</a:t>
             </a:fld>
             <a:endParaRPr kumimoji="1" lang="zh-CN" altLang="en-US"/>
           </a:p>
@@ -4995,7 +4996,7 @@
           <a:p>
             <a:fld id="{3D2A391D-1BD2-794E-8CCC-A63A886ABC5F}" type="datetimeFigureOut">
               <a:rPr kumimoji="1" lang="zh-CN" altLang="en-US" smtClean="0"/>
-              <a:t>15/12/9</a:t>
+              <a:t>2015/12/10</a:t>
             </a:fld>
             <a:endParaRPr kumimoji="1" lang="zh-CN" altLang="en-US"/>
           </a:p>
@@ -5037,7 +5038,7 @@
           <a:p>
             <a:fld id="{A8E43526-6589-1747-96E9-74479CC7908E}" type="slidenum">
               <a:rPr kumimoji="1" lang="zh-CN" altLang="en-US" smtClean="0"/>
-              <a:t>‹#›</a:t>
+              <a:t>‹N°›</a:t>
             </a:fld>
             <a:endParaRPr kumimoji="1" lang="zh-CN" altLang="en-US"/>
           </a:p>
@@ -5090,7 +5091,7 @@
           <a:p>
             <a:fld id="{3D2A391D-1BD2-794E-8CCC-A63A886ABC5F}" type="datetimeFigureOut">
               <a:rPr kumimoji="1" lang="zh-CN" altLang="en-US" smtClean="0"/>
-              <a:t>15/12/9</a:t>
+              <a:t>2015/12/10</a:t>
             </a:fld>
             <a:endParaRPr kumimoji="1" lang="zh-CN" altLang="en-US"/>
           </a:p>
@@ -5132,7 +5133,7 @@
           <a:p>
             <a:fld id="{A8E43526-6589-1747-96E9-74479CC7908E}" type="slidenum">
               <a:rPr kumimoji="1" lang="zh-CN" altLang="en-US" smtClean="0"/>
-              <a:t>‹#›</a:t>
+              <a:t>‹N°›</a:t>
             </a:fld>
             <a:endParaRPr kumimoji="1" lang="zh-CN" altLang="en-US"/>
           </a:p>
@@ -5367,7 +5368,7 @@
           <a:p>
             <a:fld id="{3D2A391D-1BD2-794E-8CCC-A63A886ABC5F}" type="datetimeFigureOut">
               <a:rPr kumimoji="1" lang="zh-CN" altLang="en-US" smtClean="0"/>
-              <a:t>15/12/9</a:t>
+              <a:t>2015/12/10</a:t>
             </a:fld>
             <a:endParaRPr kumimoji="1" lang="zh-CN" altLang="en-US"/>
           </a:p>
@@ -5409,7 +5410,7 @@
           <a:p>
             <a:fld id="{A8E43526-6589-1747-96E9-74479CC7908E}" type="slidenum">
               <a:rPr kumimoji="1" lang="zh-CN" altLang="en-US" smtClean="0"/>
-              <a:t>‹#›</a:t>
+              <a:t>‹N°›</a:t>
             </a:fld>
             <a:endParaRPr kumimoji="1" lang="zh-CN" altLang="en-US"/>
           </a:p>
@@ -5620,7 +5621,7 @@
           <a:p>
             <a:fld id="{3D2A391D-1BD2-794E-8CCC-A63A886ABC5F}" type="datetimeFigureOut">
               <a:rPr kumimoji="1" lang="zh-CN" altLang="en-US" smtClean="0"/>
-              <a:t>15/12/9</a:t>
+              <a:t>2015/12/10</a:t>
             </a:fld>
             <a:endParaRPr kumimoji="1" lang="zh-CN" altLang="en-US"/>
           </a:p>
@@ -5662,7 +5663,7 @@
           <a:p>
             <a:fld id="{A8E43526-6589-1747-96E9-74479CC7908E}" type="slidenum">
               <a:rPr kumimoji="1" lang="zh-CN" altLang="en-US" smtClean="0"/>
-              <a:t>‹#›</a:t>
+              <a:t>‹N°›</a:t>
             </a:fld>
             <a:endParaRPr kumimoji="1" lang="zh-CN" altLang="en-US"/>
           </a:p>
@@ -5833,7 +5834,7 @@
           <a:p>
             <a:fld id="{3D2A391D-1BD2-794E-8CCC-A63A886ABC5F}" type="datetimeFigureOut">
               <a:rPr kumimoji="1" lang="zh-CN" altLang="en-US" smtClean="0"/>
-              <a:t>15/12/9</a:t>
+              <a:t>2015/12/10</a:t>
             </a:fld>
             <a:endParaRPr kumimoji="1" lang="zh-CN" altLang="en-US"/>
           </a:p>
@@ -5911,7 +5912,7 @@
           <a:p>
             <a:fld id="{A8E43526-6589-1747-96E9-74479CC7908E}" type="slidenum">
               <a:rPr kumimoji="1" lang="zh-CN" altLang="en-US" smtClean="0"/>
-              <a:t>‹#›</a:t>
+              <a:t>‹N°›</a:t>
             </a:fld>
             <a:endParaRPr kumimoji="1" lang="zh-CN" altLang="en-US"/>
           </a:p>
@@ -9523,7 +9524,7 @@
                         <m:sSubPr>
                           <m:ctrlPr>
                             <a:rPr kumimoji="1" lang="en-US" altLang="zh-CN" i="1" smtClean="0">
-                              <a:latin typeface="Cambria Math" charset="0"/>
+                              <a:latin typeface="Cambria Math" panose="02040503050406030204" pitchFamily="18" charset="0"/>
                             </a:rPr>
                           </m:ctrlPr>
                         </m:sSubPr>
@@ -9554,7 +9555,7 @@
                         <m:sSubPr>
                           <m:ctrlPr>
                             <a:rPr kumimoji="1" lang="en-US" altLang="zh-CN" b="0" i="1" smtClean="0">
-                              <a:latin typeface="Cambria Math" charset="0"/>
+                              <a:latin typeface="Cambria Math" panose="02040503050406030204" pitchFamily="18" charset="0"/>
                             </a:rPr>
                           </m:ctrlPr>
                         </m:sSubPr>
@@ -9698,7 +9699,7 @@
                         <m:sSubPr>
                           <m:ctrlPr>
                             <a:rPr kumimoji="1" lang="en-US" altLang="zh-CN" i="1" smtClean="0">
-                              <a:latin typeface="Cambria Math" charset="0"/>
+                              <a:latin typeface="Cambria Math" panose="02040503050406030204" pitchFamily="18" charset="0"/>
                             </a:rPr>
                           </m:ctrlPr>
                         </m:sSubPr>
@@ -9741,7 +9742,7 @@
                         <m:sSubPr>
                           <m:ctrlPr>
                             <a:rPr kumimoji="1" lang="fr-FR" altLang="zh-CN" b="0" i="1" smtClean="0">
-                              <a:latin typeface="Cambria Math" charset="0"/>
+                              <a:latin typeface="Cambria Math" panose="02040503050406030204" pitchFamily="18" charset="0"/>
                             </a:rPr>
                           </m:ctrlPr>
                         </m:sSubPr>
@@ -9859,7 +9860,7 @@
                       <m:sSubPr>
                         <m:ctrlPr>
                           <a:rPr kumimoji="1" lang="fr-FR" altLang="zh-CN" i="1" smtClean="0">
-                            <a:latin typeface="Cambria Math" charset="0"/>
+                            <a:latin typeface="Cambria Math" panose="02040503050406030204" pitchFamily="18" charset="0"/>
                           </a:rPr>
                         </m:ctrlPr>
                       </m:sSubPr>
@@ -9978,7 +9979,7 @@
                         <m:sSubPr>
                           <m:ctrlPr>
                             <a:rPr kumimoji="1" lang="fr-FR" altLang="zh-CN" i="1" smtClean="0">
-                              <a:latin typeface="Cambria Math" charset="0"/>
+                              <a:latin typeface="Cambria Math" panose="02040503050406030204" pitchFamily="18" charset="0"/>
                             </a:rPr>
                           </m:ctrlPr>
                         </m:sSubPr>
@@ -10015,7 +10016,7 @@
                         <m:dPr>
                           <m:ctrlPr>
                             <a:rPr kumimoji="1" lang="en-US" altLang="zh-CN" b="0" i="1" smtClean="0">
-                              <a:latin typeface="Cambria Math" charset="0"/>
+                              <a:latin typeface="Cambria Math" panose="02040503050406030204" pitchFamily="18" charset="0"/>
                             </a:rPr>
                           </m:ctrlPr>
                         </m:dPr>
@@ -10024,7 +10025,7 @@
                             <m:sSubPr>
                               <m:ctrlPr>
                                 <a:rPr kumimoji="1" lang="en-US" altLang="zh-CN" b="0" i="1" smtClean="0">
-                                  <a:latin typeface="Cambria Math" charset="0"/>
+                                  <a:latin typeface="Cambria Math" panose="02040503050406030204" pitchFamily="18" charset="0"/>
                                 </a:rPr>
                               </m:ctrlPr>
                             </m:sSubPr>
@@ -10069,7 +10070,7 @@
                         <m:sSubPr>
                           <m:ctrlPr>
                             <a:rPr kumimoji="1" lang="en-US" altLang="zh-CN" b="0" i="1" smtClean="0">
-                              <a:latin typeface="Cambria Math" charset="0"/>
+                              <a:latin typeface="Cambria Math" panose="02040503050406030204" pitchFamily="18" charset="0"/>
                             </a:rPr>
                           </m:ctrlPr>
                         </m:sSubPr>
@@ -10110,7 +10111,7 @@
                             <m:sSubPr>
                               <m:ctrlPr>
                                 <a:rPr kumimoji="1" lang="fr-FR" altLang="zh-CN" b="0" i="1" smtClean="0">
-                                  <a:latin typeface="Cambria Math" charset="0"/>
+                                  <a:latin typeface="Cambria Math" panose="02040503050406030204" pitchFamily="18" charset="0"/>
                                 </a:rPr>
                               </m:ctrlPr>
                             </m:sSubPr>
@@ -10264,7 +10265,7 @@
                         <m:sSubPr>
                           <m:ctrlPr>
                             <a:rPr kumimoji="1" lang="en-US" altLang="zh-CN" i="1" smtClean="0">
-                              <a:latin typeface="Cambria Math" charset="0"/>
+                              <a:latin typeface="Cambria Math" panose="02040503050406030204" pitchFamily="18" charset="0"/>
                             </a:rPr>
                           </m:ctrlPr>
                         </m:sSubPr>
@@ -10295,7 +10296,7 @@
                         <m:dPr>
                           <m:ctrlPr>
                             <a:rPr kumimoji="1" lang="en-US" altLang="zh-CN" b="0" i="1" smtClean="0">
-                              <a:latin typeface="Cambria Math" charset="0"/>
+                              <a:latin typeface="Cambria Math" panose="02040503050406030204" pitchFamily="18" charset="0"/>
                             </a:rPr>
                           </m:ctrlPr>
                         </m:dPr>
@@ -10304,7 +10305,7 @@
                             <m:sSubPr>
                               <m:ctrlPr>
                                 <a:rPr kumimoji="1" lang="en-US" altLang="zh-CN" b="0" i="1" smtClean="0">
-                                  <a:latin typeface="Cambria Math" charset="0"/>
+                                  <a:latin typeface="Cambria Math" panose="02040503050406030204" pitchFamily="18" charset="0"/>
                                 </a:rPr>
                               </m:ctrlPr>
                             </m:sSubPr>
@@ -10349,7 +10350,7 @@
                         <m:sSubPr>
                           <m:ctrlPr>
                             <a:rPr kumimoji="1" lang="en-US" altLang="zh-CN" b="0" i="1" smtClean="0">
-                              <a:latin typeface="Cambria Math" charset="0"/>
+                              <a:latin typeface="Cambria Math" panose="02040503050406030204" pitchFamily="18" charset="0"/>
                             </a:rPr>
                           </m:ctrlPr>
                         </m:sSubPr>
@@ -10498,7 +10499,7 @@
                         <m:sSubPr>
                           <m:ctrlPr>
                             <a:rPr kumimoji="1" lang="en-US" altLang="zh-CN" sz="2400" b="1" i="1" smtClean="0">
-                              <a:latin typeface="Cambria Math" charset="0"/>
+                              <a:latin typeface="Cambria Math" panose="02040503050406030204" pitchFamily="18" charset="0"/>
                             </a:rPr>
                           </m:ctrlPr>
                         </m:sSubPr>
@@ -10541,7 +10542,7 @@
                         <m:sSubPr>
                           <m:ctrlPr>
                             <a:rPr kumimoji="1" lang="en-US" altLang="zh-CN" sz="2400" b="1" i="1" smtClean="0">
-                              <a:latin typeface="Cambria Math" charset="0"/>
+                              <a:latin typeface="Cambria Math" panose="02040503050406030204" pitchFamily="18" charset="0"/>
                             </a:rPr>
                           </m:ctrlPr>
                         </m:sSubPr>
@@ -10572,7 +10573,7 @@
                         <m:sSubPr>
                           <m:ctrlPr>
                             <a:rPr kumimoji="1" lang="en-US" altLang="zh-CN" sz="2400" b="1" i="1" smtClean="0">
-                              <a:latin typeface="Cambria Math" charset="0"/>
+                              <a:latin typeface="Cambria Math" panose="02040503050406030204" pitchFamily="18" charset="0"/>
                             </a:rPr>
                           </m:ctrlPr>
                         </m:sSubPr>
@@ -10603,7 +10604,7 @@
                         <m:sSubPr>
                           <m:ctrlPr>
                             <a:rPr kumimoji="1" lang="en-US" altLang="zh-CN" sz="2400" b="1" i="1" smtClean="0">
-                              <a:latin typeface="Cambria Math" charset="0"/>
+                              <a:latin typeface="Cambria Math" panose="02040503050406030204" pitchFamily="18" charset="0"/>
                             </a:rPr>
                           </m:ctrlPr>
                         </m:sSubPr>
@@ -10659,7 +10660,7 @@
                         <m:sSubPr>
                           <m:ctrlPr>
                             <a:rPr kumimoji="1" lang="en-US" altLang="zh-CN" sz="2400" b="1" i="1" smtClean="0">
-                              <a:latin typeface="Cambria Math" charset="0"/>
+                              <a:latin typeface="Cambria Math" panose="02040503050406030204" pitchFamily="18" charset="0"/>
                             </a:rPr>
                           </m:ctrlPr>
                         </m:sSubPr>
@@ -10702,7 +10703,7 @@
                         <m:sSubPr>
                           <m:ctrlPr>
                             <a:rPr kumimoji="1" lang="en-US" altLang="zh-CN" sz="2400" b="1" i="1" smtClean="0">
-                              <a:latin typeface="Cambria Math" charset="0"/>
+                              <a:latin typeface="Cambria Math" panose="02040503050406030204" pitchFamily="18" charset="0"/>
                             </a:rPr>
                           </m:ctrlPr>
                         </m:sSubPr>
@@ -10733,7 +10734,7 @@
                         <m:sSubPr>
                           <m:ctrlPr>
                             <a:rPr kumimoji="1" lang="en-US" altLang="zh-CN" sz="2400" b="1" i="1" smtClean="0">
-                              <a:latin typeface="Cambria Math" charset="0"/>
+                              <a:latin typeface="Cambria Math" panose="02040503050406030204" pitchFamily="18" charset="0"/>
                             </a:rPr>
                           </m:ctrlPr>
                         </m:sSubPr>
@@ -11173,8 +11174,8 @@
           </a:prstGeom>
         </p:spPr>
       </p:pic>
-      <mc:AlternateContent xmlns:mc="http://schemas.openxmlformats.org/markup-compatibility/2006">
-        <mc:Choice xmlns:a14="http://schemas.microsoft.com/office/drawing/2010/main" Requires="a14">
+      <mc:AlternateContent xmlns:mc="http://schemas.openxmlformats.org/markup-compatibility/2006" xmlns:a14="http://schemas.microsoft.com/office/drawing/2010/main">
+        <mc:Choice Requires="a14">
           <p:sp>
             <p:nvSpPr>
               <p:cNvPr id="3" name="文本框 2"/>
@@ -11200,6 +11201,7 @@
               </a:bodyPr>
               <a:lstStyle/>
               <a:p>
+                <a:pPr/>
                 <a14:m>
                   <m:oMathPara xmlns:m="http://schemas.openxmlformats.org/officeDocument/2006/math">
                     <m:oMathParaPr>
@@ -11210,7 +11212,7 @@
                         <m:sSubPr>
                           <m:ctrlPr>
                             <a:rPr kumimoji="1" lang="en-US" altLang="zh-CN" i="1" smtClean="0">
-                              <a:latin typeface="Cambria Math" charset="0"/>
+                              <a:latin typeface="Cambria Math" panose="02040503050406030204" pitchFamily="18" charset="0"/>
                             </a:rPr>
                           </m:ctrlPr>
                         </m:sSubPr>
@@ -11260,7 +11262,7 @@
             </p:txBody>
           </p:sp>
         </mc:Choice>
-        <mc:Fallback>
+        <mc:Fallback xmlns="">
           <p:sp>
             <p:nvSpPr>
               <p:cNvPr id="3" name="文本框 2"/>
@@ -11302,8 +11304,8 @@
           </p:sp>
         </mc:Fallback>
       </mc:AlternateContent>
-      <mc:AlternateContent xmlns:mc="http://schemas.openxmlformats.org/markup-compatibility/2006">
-        <mc:Choice xmlns:a14="http://schemas.microsoft.com/office/drawing/2010/main" Requires="a14">
+      <mc:AlternateContent xmlns:mc="http://schemas.openxmlformats.org/markup-compatibility/2006" xmlns:a14="http://schemas.microsoft.com/office/drawing/2010/main">
+        <mc:Choice Requires="a14">
           <p:sp>
             <p:nvSpPr>
               <p:cNvPr id="4" name="文本框 3"/>
@@ -11329,6 +11331,7 @@
               </a:bodyPr>
               <a:lstStyle/>
               <a:p>
+                <a:pPr/>
                 <a14:m>
                   <m:oMathPara xmlns:m="http://schemas.openxmlformats.org/officeDocument/2006/math">
                     <m:oMathParaPr>
@@ -11342,7 +11345,7 @@
                               <a:solidFill>
                                 <a:schemeClr val="accent6"/>
                               </a:solidFill>
-                              <a:latin typeface="Cambria Math" charset="0"/>
+                              <a:latin typeface="Cambria Math" panose="02040503050406030204" pitchFamily="18" charset="0"/>
                             </a:rPr>
                           </m:ctrlPr>
                         </m:sSubPr>
@@ -11411,7 +11414,7 @@
             </p:txBody>
           </p:sp>
         </mc:Choice>
-        <mc:Fallback>
+        <mc:Fallback xmlns="">
           <p:sp>
             <p:nvSpPr>
               <p:cNvPr id="4" name="文本框 3"/>
@@ -11543,8 +11546,8 @@
           </a:prstGeom>
         </p:spPr>
       </p:pic>
-      <mc:AlternateContent xmlns:mc="http://schemas.openxmlformats.org/markup-compatibility/2006">
-        <mc:Choice xmlns:a14="http://schemas.microsoft.com/office/drawing/2010/main" Requires="a14">
+      <mc:AlternateContent xmlns:mc="http://schemas.openxmlformats.org/markup-compatibility/2006" xmlns:a14="http://schemas.microsoft.com/office/drawing/2010/main">
+        <mc:Choice Requires="a14">
           <p:sp>
             <p:nvSpPr>
               <p:cNvPr id="8" name="文本框 7"/>
@@ -11626,7 +11629,6 @@
                   <a:rPr lang="en-US" altLang="zh-CN" dirty="0"/>
                   <a:t> </a:t>
                 </a:r>
-                <a:endParaRPr lang="en-US" altLang="zh-CN" dirty="0"/>
               </a:p>
               <a:p>
                 <a:r>
@@ -11676,7 +11678,6 @@
                   <a:rPr lang="en-US" altLang="zh-CN" dirty="0"/>
                   <a:t> thermal time </a:t>
                 </a:r>
-                <a:endParaRPr lang="en-US" altLang="zh-CN" dirty="0"/>
               </a:p>
               <a:p>
                 <a:r>
@@ -11695,7 +11696,6 @@
                   <a:rPr lang="en-US" altLang="zh-CN" dirty="0"/>
                   <a:t> cumulative distribution function </a:t>
                 </a:r>
-                <a:endParaRPr lang="en-US" altLang="zh-CN" dirty="0"/>
               </a:p>
               <a:p>
                 <a14:m>
@@ -11704,7 +11704,7 @@
                       <m:sSubPr>
                         <m:ctrlPr>
                           <a:rPr lang="en-US" altLang="zh-CN" i="1" smtClean="0">
-                            <a:latin typeface="Cambria Math" charset="0"/>
+                            <a:latin typeface="Cambria Math" panose="02040503050406030204" pitchFamily="18" charset="0"/>
                           </a:rPr>
                         </m:ctrlPr>
                       </m:sSubPr>
@@ -11763,7 +11763,7 @@
             </p:txBody>
           </p:sp>
         </mc:Choice>
-        <mc:Fallback>
+        <mc:Fallback xmlns="">
           <p:sp>
             <p:nvSpPr>
               <p:cNvPr id="8" name="文本框 7"/>
@@ -11802,8 +11802,8 @@
           </p:sp>
         </mc:Fallback>
       </mc:AlternateContent>
-      <mc:AlternateContent xmlns:mc="http://schemas.openxmlformats.org/markup-compatibility/2006">
-        <mc:Choice xmlns:a14="http://schemas.microsoft.com/office/drawing/2010/main" Requires="a14">
+      <mc:AlternateContent xmlns:mc="http://schemas.openxmlformats.org/markup-compatibility/2006" xmlns:a14="http://schemas.microsoft.com/office/drawing/2010/main">
+        <mc:Choice Requires="a14">
           <p:sp>
             <p:nvSpPr>
               <p:cNvPr id="10" name="文本框 9"/>
@@ -11861,7 +11861,7 @@
             </p:txBody>
           </p:sp>
         </mc:Choice>
-        <mc:Fallback>
+        <mc:Fallback xmlns="">
           <p:sp>
             <p:nvSpPr>
               <p:cNvPr id="10" name="文本框 9"/>
@@ -11907,6 +11907,771 @@
     <p:extLst>
       <p:ext uri="{BB962C8B-B14F-4D97-AF65-F5344CB8AC3E}">
         <p14:creationId xmlns:p14="http://schemas.microsoft.com/office/powerpoint/2010/main" val="1535818335"/>
+      </p:ext>
+    </p:extLst>
+  </p:cSld>
+  <p:clrMapOvr>
+    <a:masterClrMapping/>
+  </p:clrMapOvr>
+</p:sld>
+</file>
+
+<file path=ppt/slides/slide4.xml><?xml version="1.0" encoding="utf-8"?>
+<p:sld xmlns:a="http://schemas.openxmlformats.org/drawingml/2006/main" xmlns:r="http://schemas.openxmlformats.org/officeDocument/2006/relationships" xmlns:p="http://schemas.openxmlformats.org/presentationml/2006/main">
+  <p:cSld>
+    <p:spTree>
+      <p:nvGrpSpPr>
+        <p:cNvPr id="1" name=""/>
+        <p:cNvGrpSpPr/>
+        <p:nvPr/>
+      </p:nvGrpSpPr>
+      <p:grpSpPr>
+        <a:xfrm>
+          <a:off x="0" y="0"/>
+          <a:ext cx="0" cy="0"/>
+          <a:chOff x="0" y="0"/>
+          <a:chExt cx="0" cy="0"/>
+        </a:xfrm>
+      </p:grpSpPr>
+      <p:grpSp>
+        <p:nvGrpSpPr>
+          <p:cNvPr id="25" name="Groupe 24"/>
+          <p:cNvGrpSpPr/>
+          <p:nvPr/>
+        </p:nvGrpSpPr>
+        <p:grpSpPr>
+          <a:xfrm>
+            <a:off x="2122370" y="1304971"/>
+            <a:ext cx="7454765" cy="3953394"/>
+            <a:chOff x="1843239" y="1128744"/>
+            <a:chExt cx="7454765" cy="3953394"/>
+          </a:xfrm>
+        </p:grpSpPr>
+        <p:sp>
+          <p:nvSpPr>
+            <p:cNvPr id="2" name="Ellipse 1"/>
+            <p:cNvSpPr/>
+            <p:nvPr/>
+          </p:nvSpPr>
+          <p:spPr>
+            <a:xfrm>
+              <a:off x="5048450" y="2569945"/>
+              <a:ext cx="1588169" cy="1530416"/>
+            </a:xfrm>
+            <a:prstGeom prst="ellipse">
+              <a:avLst/>
+            </a:prstGeom>
+          </p:spPr>
+          <p:style>
+            <a:lnRef idx="0">
+              <a:schemeClr val="accent3"/>
+            </a:lnRef>
+            <a:fillRef idx="3">
+              <a:schemeClr val="accent3"/>
+            </a:fillRef>
+            <a:effectRef idx="3">
+              <a:schemeClr val="accent3"/>
+            </a:effectRef>
+            <a:fontRef idx="minor">
+              <a:schemeClr val="lt1"/>
+            </a:fontRef>
+          </p:style>
+          <p:txBody>
+            <a:bodyPr rtlCol="0" anchor="ctr"/>
+            <a:lstStyle/>
+            <a:p>
+              <a:pPr algn="ctr"/>
+              <a:r>
+                <a:rPr lang="fr-FR" dirty="0" smtClean="0"/>
+                <a:t>Pool de Biomasse</a:t>
+              </a:r>
+            </a:p>
+          </p:txBody>
+        </p:sp>
+        <p:sp>
+          <p:nvSpPr>
+            <p:cNvPr id="5" name="Rectangle à coins arrondis 4"/>
+            <p:cNvSpPr/>
+            <p:nvPr/>
+          </p:nvSpPr>
+          <p:spPr>
+            <a:xfrm>
+              <a:off x="7584707" y="2829826"/>
+              <a:ext cx="1713297" cy="1010653"/>
+            </a:xfrm>
+            <a:prstGeom prst="roundRect">
+              <a:avLst/>
+            </a:prstGeom>
+          </p:spPr>
+          <p:style>
+            <a:lnRef idx="0">
+              <a:schemeClr val="accent2"/>
+            </a:lnRef>
+            <a:fillRef idx="3">
+              <a:schemeClr val="accent2"/>
+            </a:fillRef>
+            <a:effectRef idx="3">
+              <a:schemeClr val="accent2"/>
+            </a:effectRef>
+            <a:fontRef idx="minor">
+              <a:schemeClr val="lt1"/>
+            </a:fontRef>
+          </p:style>
+          <p:txBody>
+            <a:bodyPr rtlCol="0" anchor="ctr"/>
+            <a:lstStyle/>
+            <a:p>
+              <a:pPr algn="ctr"/>
+              <a:r>
+                <a:rPr lang="fr-FR" dirty="0" smtClean="0"/>
+                <a:t>Racine</a:t>
+              </a:r>
+            </a:p>
+          </p:txBody>
+        </p:sp>
+        <mc:AlternateContent xmlns:mc="http://schemas.openxmlformats.org/markup-compatibility/2006">
+          <mc:Choice xmlns:a14="http://schemas.microsoft.com/office/drawing/2010/main" Requires="a14">
+            <p:sp>
+              <p:nvSpPr>
+                <p:cNvPr id="6" name="ZoneTexte 5"/>
+                <p:cNvSpPr txBox="1"/>
+                <p:nvPr/>
+              </p:nvSpPr>
+              <p:spPr>
+                <a:xfrm>
+                  <a:off x="3710539" y="2912336"/>
+                  <a:ext cx="1588169" cy="369332"/>
+                </a:xfrm>
+                <a:prstGeom prst="rect">
+                  <a:avLst/>
+                </a:prstGeom>
+                <a:noFill/>
+              </p:spPr>
+              <p:txBody>
+                <a:bodyPr wrap="square" rtlCol="0">
+                  <a:spAutoFit/>
+                </a:bodyPr>
+                <a:lstStyle/>
+                <a:p>
+                  <a:pPr algn="ctr"/>
+                  <a14:m>
+                    <m:oMath xmlns:m="http://schemas.openxmlformats.org/officeDocument/2006/math">
+                      <m:r>
+                        <a:rPr lang="fr-FR" i="1" smtClean="0">
+                          <a:latin typeface="Cambria Math" panose="02040503050406030204" pitchFamily="18" charset="0"/>
+                          <a:ea typeface="Cambria Math" panose="02040503050406030204" pitchFamily="18" charset="0"/>
+                        </a:rPr>
+                        <m:t>𝛾</m:t>
+                      </m:r>
+                    </m:oMath>
+                  </a14:m>
+                  <a:r>
+                    <a:rPr lang="fr-FR" dirty="0" smtClean="0"/>
+                    <a:t>(t)</a:t>
+                  </a:r>
+                  <a:endParaRPr lang="fr-FR" dirty="0"/>
+                </a:p>
+              </p:txBody>
+            </p:sp>
+          </mc:Choice>
+          <mc:Fallback>
+            <p:sp>
+              <p:nvSpPr>
+                <p:cNvPr id="6" name="ZoneTexte 5"/>
+                <p:cNvSpPr txBox="1">
+                  <a:spLocks noRot="1" noChangeAspect="1" noMove="1" noResize="1" noEditPoints="1" noAdjustHandles="1" noChangeArrowheads="1" noChangeShapeType="1" noTextEdit="1"/>
+                </p:cNvSpPr>
+                <p:nvPr/>
+              </p:nvSpPr>
+              <p:spPr>
+                <a:xfrm>
+                  <a:off x="3710539" y="2912336"/>
+                  <a:ext cx="1588169" cy="369332"/>
+                </a:xfrm>
+                <a:prstGeom prst="rect">
+                  <a:avLst/>
+                </a:prstGeom>
+                <a:blipFill rotWithShape="0">
+                  <a:blip r:embed="rId2"/>
+                  <a:stretch>
+                    <a:fillRect t="-10000" b="-26667"/>
+                  </a:stretch>
+                </a:blipFill>
+              </p:spPr>
+              <p:txBody>
+                <a:bodyPr/>
+                <a:lstStyle/>
+                <a:p>
+                  <a:r>
+                    <a:rPr lang="fr-FR">
+                      <a:noFill/>
+                    </a:rPr>
+                    <a:t> </a:t>
+                  </a:r>
+                </a:p>
+              </p:txBody>
+            </p:sp>
+          </mc:Fallback>
+        </mc:AlternateContent>
+        <p:sp>
+          <p:nvSpPr>
+            <p:cNvPr id="8" name="ZoneTexte 7"/>
+            <p:cNvSpPr txBox="1"/>
+            <p:nvPr/>
+          </p:nvSpPr>
+          <p:spPr>
+            <a:xfrm>
+              <a:off x="7647270" y="3471147"/>
+              <a:ext cx="1588169" cy="369332"/>
+            </a:xfrm>
+            <a:prstGeom prst="rect">
+              <a:avLst/>
+            </a:prstGeom>
+            <a:noFill/>
+          </p:spPr>
+          <p:txBody>
+            <a:bodyPr wrap="square" rtlCol="0">
+              <a:spAutoFit/>
+            </a:bodyPr>
+            <a:lstStyle/>
+            <a:p>
+              <a:pPr algn="ctr"/>
+              <a:r>
+                <a:rPr lang="fr-FR" dirty="0" err="1" smtClean="0"/>
+                <a:t>Q</a:t>
+              </a:r>
+              <a:r>
+                <a:rPr lang="fr-FR" baseline="-25000" dirty="0" err="1" smtClean="0"/>
+                <a:t>r</a:t>
+              </a:r>
+              <a:r>
+                <a:rPr lang="fr-FR" dirty="0" smtClean="0"/>
+                <a:t>(t+1)</a:t>
+              </a:r>
+              <a:endParaRPr lang="fr-FR" dirty="0"/>
+            </a:p>
+          </p:txBody>
+        </p:sp>
+        <p:grpSp>
+          <p:nvGrpSpPr>
+            <p:cNvPr id="19" name="Groupe 18"/>
+            <p:cNvGrpSpPr/>
+            <p:nvPr/>
+          </p:nvGrpSpPr>
+          <p:grpSpPr>
+            <a:xfrm>
+              <a:off x="1843239" y="1588168"/>
+              <a:ext cx="2194560" cy="3493970"/>
+              <a:chOff x="2107933" y="2069433"/>
+              <a:chExt cx="2194560" cy="3493970"/>
+            </a:xfrm>
+          </p:grpSpPr>
+          <p:sp>
+            <p:nvSpPr>
+              <p:cNvPr id="11" name="Rectangle à coins arrondis 10"/>
+              <p:cNvSpPr/>
+              <p:nvPr/>
+            </p:nvSpPr>
+            <p:spPr>
+              <a:xfrm>
+                <a:off x="2107933" y="2069433"/>
+                <a:ext cx="2194560" cy="3493970"/>
+              </a:xfrm>
+              <a:prstGeom prst="roundRect">
+                <a:avLst/>
+              </a:prstGeom>
+            </p:spPr>
+            <p:style>
+              <a:lnRef idx="0">
+                <a:schemeClr val="accent5"/>
+              </a:lnRef>
+              <a:fillRef idx="3">
+                <a:schemeClr val="accent5"/>
+              </a:fillRef>
+              <a:effectRef idx="3">
+                <a:schemeClr val="accent5"/>
+              </a:effectRef>
+              <a:fontRef idx="minor">
+                <a:schemeClr val="lt1"/>
+              </a:fontRef>
+            </p:style>
+            <p:txBody>
+              <a:bodyPr rtlCol="0" anchor="t"/>
+              <a:lstStyle/>
+              <a:p>
+                <a:pPr algn="ctr"/>
+                <a:r>
+                  <a:rPr lang="fr-FR" dirty="0" smtClean="0"/>
+                  <a:t>Feuillage</a:t>
+                </a:r>
+                <a:endParaRPr lang="fr-FR" dirty="0"/>
+              </a:p>
+            </p:txBody>
+          </p:sp>
+          <p:sp>
+            <p:nvSpPr>
+              <p:cNvPr id="3" name="Rectangle à coins arrondis 2"/>
+              <p:cNvSpPr/>
+              <p:nvPr/>
+            </p:nvSpPr>
+            <p:spPr>
+              <a:xfrm>
+                <a:off x="2387065" y="2829827"/>
+                <a:ext cx="1713297" cy="1010653"/>
+              </a:xfrm>
+              <a:prstGeom prst="roundRect">
+                <a:avLst/>
+              </a:prstGeom>
+            </p:spPr>
+            <p:style>
+              <a:lnRef idx="0">
+                <a:schemeClr val="accent6"/>
+              </a:lnRef>
+              <a:fillRef idx="3">
+                <a:schemeClr val="accent6"/>
+              </a:fillRef>
+              <a:effectRef idx="3">
+                <a:schemeClr val="accent6"/>
+              </a:effectRef>
+              <a:fontRef idx="minor">
+                <a:schemeClr val="lt1"/>
+              </a:fontRef>
+            </p:style>
+            <p:txBody>
+              <a:bodyPr rtlCol="0" anchor="ctr"/>
+              <a:lstStyle/>
+              <a:p>
+                <a:pPr algn="ctr"/>
+                <a:r>
+                  <a:rPr lang="fr-FR" dirty="0" smtClean="0"/>
+                  <a:t>Feuillage vert</a:t>
+                </a:r>
+                <a:endParaRPr lang="fr-FR" dirty="0"/>
+              </a:p>
+            </p:txBody>
+          </p:sp>
+          <p:sp>
+            <p:nvSpPr>
+              <p:cNvPr id="4" name="Rectangle à coins arrondis 3"/>
+              <p:cNvSpPr/>
+              <p:nvPr/>
+            </p:nvSpPr>
+            <p:spPr>
+              <a:xfrm>
+                <a:off x="2387064" y="4166134"/>
+                <a:ext cx="1713297" cy="1010653"/>
+              </a:xfrm>
+              <a:prstGeom prst="roundRect">
+                <a:avLst/>
+              </a:prstGeom>
+            </p:spPr>
+            <p:style>
+              <a:lnRef idx="0">
+                <a:schemeClr val="accent4"/>
+              </a:lnRef>
+              <a:fillRef idx="3">
+                <a:schemeClr val="accent4"/>
+              </a:fillRef>
+              <a:effectRef idx="3">
+                <a:schemeClr val="accent4"/>
+              </a:effectRef>
+              <a:fontRef idx="minor">
+                <a:schemeClr val="lt1"/>
+              </a:fontRef>
+            </p:style>
+            <p:txBody>
+              <a:bodyPr rtlCol="0" anchor="ctr"/>
+              <a:lstStyle/>
+              <a:p>
+                <a:pPr algn="ctr"/>
+                <a:r>
+                  <a:rPr lang="fr-FR" dirty="0" smtClean="0"/>
+                  <a:t>Feuillage Sénescent</a:t>
+                </a:r>
+                <a:endParaRPr lang="fr-FR" dirty="0"/>
+              </a:p>
+            </p:txBody>
+          </p:sp>
+          <p:sp>
+            <p:nvSpPr>
+              <p:cNvPr id="7" name="ZoneTexte 6"/>
+              <p:cNvSpPr txBox="1"/>
+              <p:nvPr/>
+            </p:nvSpPr>
+            <p:spPr>
+              <a:xfrm>
+                <a:off x="2387064" y="3427470"/>
+                <a:ext cx="1588169" cy="369332"/>
+              </a:xfrm>
+              <a:prstGeom prst="rect">
+                <a:avLst/>
+              </a:prstGeom>
+              <a:noFill/>
+            </p:spPr>
+            <p:txBody>
+              <a:bodyPr wrap="square" rtlCol="0">
+                <a:spAutoFit/>
+              </a:bodyPr>
+              <a:lstStyle/>
+              <a:p>
+                <a:pPr algn="ctr"/>
+                <a:r>
+                  <a:rPr lang="fr-FR" dirty="0" err="1" smtClean="0"/>
+                  <a:t>Q</a:t>
+                </a:r>
+                <a:r>
+                  <a:rPr lang="fr-FR" baseline="-25000" dirty="0" err="1" smtClean="0"/>
+                  <a:t>g</a:t>
+                </a:r>
+                <a:r>
+                  <a:rPr lang="fr-FR" dirty="0" smtClean="0"/>
+                  <a:t>(t+1)</a:t>
+                </a:r>
+                <a:endParaRPr lang="fr-FR" dirty="0"/>
+              </a:p>
+            </p:txBody>
+          </p:sp>
+          <p:sp>
+            <p:nvSpPr>
+              <p:cNvPr id="9" name="ZoneTexte 8"/>
+              <p:cNvSpPr txBox="1"/>
+              <p:nvPr/>
+            </p:nvSpPr>
+            <p:spPr>
+              <a:xfrm>
+                <a:off x="2430378" y="4892478"/>
+                <a:ext cx="1588169" cy="369332"/>
+              </a:xfrm>
+              <a:prstGeom prst="rect">
+                <a:avLst/>
+              </a:prstGeom>
+              <a:noFill/>
+            </p:spPr>
+            <p:txBody>
+              <a:bodyPr wrap="square" rtlCol="0">
+                <a:spAutoFit/>
+              </a:bodyPr>
+              <a:lstStyle/>
+              <a:p>
+                <a:pPr algn="ctr"/>
+                <a:r>
+                  <a:rPr lang="fr-FR" dirty="0" err="1" smtClean="0"/>
+                  <a:t>Q</a:t>
+                </a:r>
+                <a:r>
+                  <a:rPr lang="fr-FR" baseline="-25000" dirty="0" err="1" smtClean="0"/>
+                  <a:t>s</a:t>
+                </a:r>
+                <a:r>
+                  <a:rPr lang="fr-FR" dirty="0" smtClean="0"/>
+                  <a:t>(t+1)</a:t>
+                </a:r>
+                <a:endParaRPr lang="fr-FR" dirty="0"/>
+              </a:p>
+            </p:txBody>
+          </p:sp>
+          <p:sp>
+            <p:nvSpPr>
+              <p:cNvPr id="12" name="ZoneTexte 11"/>
+              <p:cNvSpPr txBox="1"/>
+              <p:nvPr/>
+            </p:nvSpPr>
+            <p:spPr>
+              <a:xfrm>
+                <a:off x="2430378" y="2443211"/>
+                <a:ext cx="1588169" cy="369332"/>
+              </a:xfrm>
+              <a:prstGeom prst="rect">
+                <a:avLst/>
+              </a:prstGeom>
+              <a:noFill/>
+            </p:spPr>
+            <p:txBody>
+              <a:bodyPr wrap="square" rtlCol="0">
+                <a:spAutoFit/>
+              </a:bodyPr>
+              <a:lstStyle/>
+              <a:p>
+                <a:pPr algn="ctr"/>
+                <a:r>
+                  <a:rPr lang="fr-FR" dirty="0" err="1" smtClean="0"/>
+                  <a:t>Q</a:t>
+                </a:r>
+                <a:r>
+                  <a:rPr lang="fr-FR" baseline="-25000" dirty="0" err="1" smtClean="0"/>
+                  <a:t>f</a:t>
+                </a:r>
+                <a:r>
+                  <a:rPr lang="fr-FR" dirty="0" smtClean="0"/>
+                  <a:t>(t+1)</a:t>
+                </a:r>
+                <a:endParaRPr lang="fr-FR" dirty="0"/>
+              </a:p>
+            </p:txBody>
+          </p:sp>
+        </p:grpSp>
+        <p:cxnSp>
+          <p:nvCxnSpPr>
+            <p:cNvPr id="14" name="Connecteur droit avec flèche 13"/>
+            <p:cNvCxnSpPr>
+              <a:stCxn id="2" idx="2"/>
+              <a:endCxn id="11" idx="3"/>
+            </p:cNvCxnSpPr>
+            <p:nvPr/>
+          </p:nvCxnSpPr>
+          <p:spPr>
+            <a:xfrm flipH="1">
+              <a:off x="4037799" y="3335153"/>
+              <a:ext cx="1010651" cy="0"/>
+            </a:xfrm>
+            <a:prstGeom prst="straightConnector1">
+              <a:avLst/>
+            </a:prstGeom>
+            <a:ln>
+              <a:tailEnd type="triangle"/>
+            </a:ln>
+          </p:spPr>
+          <p:style>
+            <a:lnRef idx="3">
+              <a:schemeClr val="dk1"/>
+            </a:lnRef>
+            <a:fillRef idx="0">
+              <a:schemeClr val="dk1"/>
+            </a:fillRef>
+            <a:effectRef idx="2">
+              <a:schemeClr val="dk1"/>
+            </a:effectRef>
+            <a:fontRef idx="minor">
+              <a:schemeClr val="tx1"/>
+            </a:fontRef>
+          </p:style>
+        </p:cxnSp>
+        <p:cxnSp>
+          <p:nvCxnSpPr>
+            <p:cNvPr id="16" name="Connecteur droit avec flèche 15"/>
+            <p:cNvCxnSpPr>
+              <a:stCxn id="2" idx="6"/>
+              <a:endCxn id="5" idx="1"/>
+            </p:cNvCxnSpPr>
+            <p:nvPr/>
+          </p:nvCxnSpPr>
+          <p:spPr>
+            <a:xfrm>
+              <a:off x="6636619" y="3335153"/>
+              <a:ext cx="948088" cy="0"/>
+            </a:xfrm>
+            <a:prstGeom prst="straightConnector1">
+              <a:avLst/>
+            </a:prstGeom>
+            <a:ln>
+              <a:tailEnd type="triangle"/>
+            </a:ln>
+          </p:spPr>
+          <p:style>
+            <a:lnRef idx="3">
+              <a:schemeClr val="dk1"/>
+            </a:lnRef>
+            <a:fillRef idx="0">
+              <a:schemeClr val="dk1"/>
+            </a:fillRef>
+            <a:effectRef idx="2">
+              <a:schemeClr val="dk1"/>
+            </a:effectRef>
+            <a:fontRef idx="minor">
+              <a:schemeClr val="tx1"/>
+            </a:fontRef>
+          </p:style>
+        </p:cxnSp>
+        <p:cxnSp>
+          <p:nvCxnSpPr>
+            <p:cNvPr id="21" name="Connecteur droit avec flèche 20"/>
+            <p:cNvCxnSpPr/>
+            <p:nvPr/>
+          </p:nvCxnSpPr>
+          <p:spPr>
+            <a:xfrm flipH="1">
+              <a:off x="6362299" y="1588168"/>
+              <a:ext cx="981777" cy="981777"/>
+            </a:xfrm>
+            <a:prstGeom prst="straightConnector1">
+              <a:avLst/>
+            </a:prstGeom>
+            <a:ln>
+              <a:tailEnd type="triangle"/>
+            </a:ln>
+          </p:spPr>
+          <p:style>
+            <a:lnRef idx="3">
+              <a:schemeClr val="accent4"/>
+            </a:lnRef>
+            <a:fillRef idx="0">
+              <a:schemeClr val="accent4"/>
+            </a:fillRef>
+            <a:effectRef idx="2">
+              <a:schemeClr val="accent4"/>
+            </a:effectRef>
+            <a:fontRef idx="minor">
+              <a:schemeClr val="tx1"/>
+            </a:fontRef>
+          </p:style>
+        </p:cxnSp>
+        <p:sp>
+          <p:nvSpPr>
+            <p:cNvPr id="22" name="ZoneTexte 21"/>
+            <p:cNvSpPr txBox="1"/>
+            <p:nvPr/>
+          </p:nvSpPr>
+          <p:spPr>
+            <a:xfrm>
+              <a:off x="6549991" y="1128744"/>
+              <a:ext cx="1588169" cy="369332"/>
+            </a:xfrm>
+            <a:prstGeom prst="rect">
+              <a:avLst/>
+            </a:prstGeom>
+            <a:noFill/>
+          </p:spPr>
+          <p:txBody>
+            <a:bodyPr wrap="square" rtlCol="0">
+              <a:spAutoFit/>
+            </a:bodyPr>
+            <a:lstStyle/>
+            <a:p>
+              <a:pPr algn="ctr"/>
+              <a:r>
+                <a:rPr lang="fr-FR" dirty="0" smtClean="0"/>
+                <a:t>Photosynthèse</a:t>
+              </a:r>
+              <a:endParaRPr lang="fr-FR" dirty="0"/>
+            </a:p>
+          </p:txBody>
+        </p:sp>
+        <p:sp>
+          <p:nvSpPr>
+            <p:cNvPr id="23" name="ZoneTexte 22"/>
+            <p:cNvSpPr txBox="1"/>
+            <p:nvPr/>
+          </p:nvSpPr>
+          <p:spPr>
+            <a:xfrm>
+              <a:off x="5079732" y="3641103"/>
+              <a:ext cx="1588169" cy="369332"/>
+            </a:xfrm>
+            <a:prstGeom prst="rect">
+              <a:avLst/>
+            </a:prstGeom>
+            <a:noFill/>
+          </p:spPr>
+          <p:txBody>
+            <a:bodyPr wrap="square" rtlCol="0">
+              <a:spAutoFit/>
+            </a:bodyPr>
+            <a:lstStyle/>
+            <a:p>
+              <a:pPr algn="ctr"/>
+              <a:r>
+                <a:rPr lang="fr-FR" dirty="0" smtClean="0"/>
+                <a:t>Q(t)</a:t>
+              </a:r>
+              <a:endParaRPr lang="fr-FR" dirty="0"/>
+            </a:p>
+          </p:txBody>
+        </p:sp>
+        <mc:AlternateContent xmlns:mc="http://schemas.openxmlformats.org/markup-compatibility/2006">
+          <mc:Choice xmlns:a14="http://schemas.microsoft.com/office/drawing/2010/main" Requires="a14">
+            <p:sp>
+              <p:nvSpPr>
+                <p:cNvPr id="24" name="ZoneTexte 23"/>
+                <p:cNvSpPr txBox="1"/>
+                <p:nvPr/>
+              </p:nvSpPr>
+              <p:spPr>
+                <a:xfrm>
+                  <a:off x="6333422" y="2912336"/>
+                  <a:ext cx="1588169" cy="369332"/>
+                </a:xfrm>
+                <a:prstGeom prst="rect">
+                  <a:avLst/>
+                </a:prstGeom>
+                <a:noFill/>
+              </p:spPr>
+              <p:txBody>
+                <a:bodyPr wrap="square" rtlCol="0">
+                  <a:spAutoFit/>
+                </a:bodyPr>
+                <a:lstStyle/>
+                <a:p>
+                  <a:pPr algn="ctr"/>
+                  <a:r>
+                    <a:rPr lang="fr-FR" dirty="0" smtClean="0">
+                      <a:ea typeface="Cambria Math" panose="02040503050406030204" pitchFamily="18" charset="0"/>
+                    </a:rPr>
+                    <a:t>1 - </a:t>
+                  </a:r>
+                  <a14:m>
+                    <m:oMath xmlns:m="http://schemas.openxmlformats.org/officeDocument/2006/math">
+                      <m:r>
+                        <a:rPr lang="fr-FR" i="1" smtClean="0">
+                          <a:latin typeface="Cambria Math" panose="02040503050406030204" pitchFamily="18" charset="0"/>
+                          <a:ea typeface="Cambria Math" panose="02040503050406030204" pitchFamily="18" charset="0"/>
+                        </a:rPr>
+                        <m:t>𝛾</m:t>
+                      </m:r>
+                    </m:oMath>
+                  </a14:m>
+                  <a:r>
+                    <a:rPr lang="fr-FR" dirty="0" smtClean="0"/>
+                    <a:t>(t)</a:t>
+                  </a:r>
+                  <a:endParaRPr lang="fr-FR" dirty="0"/>
+                </a:p>
+              </p:txBody>
+            </p:sp>
+          </mc:Choice>
+          <mc:Fallback>
+            <p:sp>
+              <p:nvSpPr>
+                <p:cNvPr id="24" name="ZoneTexte 23"/>
+                <p:cNvSpPr txBox="1">
+                  <a:spLocks noRot="1" noChangeAspect="1" noMove="1" noResize="1" noEditPoints="1" noAdjustHandles="1" noChangeArrowheads="1" noChangeShapeType="1" noTextEdit="1"/>
+                </p:cNvSpPr>
+                <p:nvPr/>
+              </p:nvSpPr>
+              <p:spPr>
+                <a:xfrm>
+                  <a:off x="6333422" y="2912336"/>
+                  <a:ext cx="1588169" cy="369332"/>
+                </a:xfrm>
+                <a:prstGeom prst="rect">
+                  <a:avLst/>
+                </a:prstGeom>
+                <a:blipFill rotWithShape="0">
+                  <a:blip r:embed="rId3"/>
+                  <a:stretch>
+                    <a:fillRect t="-10000" b="-26667"/>
+                  </a:stretch>
+                </a:blipFill>
+              </p:spPr>
+              <p:txBody>
+                <a:bodyPr/>
+                <a:lstStyle/>
+                <a:p>
+                  <a:r>
+                    <a:rPr lang="fr-FR">
+                      <a:noFill/>
+                    </a:rPr>
+                    <a:t> </a:t>
+                  </a:r>
+                </a:p>
+              </p:txBody>
+            </p:sp>
+          </mc:Fallback>
+        </mc:AlternateContent>
+      </p:grpSp>
+    </p:spTree>
+    <p:extLst>
+      <p:ext uri="{BB962C8B-B14F-4D97-AF65-F5344CB8AC3E}">
+        <p14:creationId xmlns:p14="http://schemas.microsoft.com/office/powerpoint/2010/main" val="1941815586"/>
       </p:ext>
     </p:extLst>
   </p:cSld>

</xml_diff>